<commit_message>
itatlics, spacing, minus adding, subscript, resizing and re-formatting pictures
</commit_message>
<xml_diff>
--- a/tutorial-05-overdecomposition.pptx
+++ b/tutorial-05-overdecomposition.pptx
@@ -7083,7 +7083,7 @@
               </a:ext>
             </a:extLst>
           </a:blip>
-          <a:srcRect t="5991" b="5991"/>
+          <a:srcRect l="-6808" r="-6808"/>
           <a:stretch>
             <a:fillRect/>
           </a:stretch>
@@ -7244,7 +7244,7 @@
               </a:ext>
             </a:extLst>
           </a:blip>
-          <a:srcRect t="4832" b="4832"/>
+          <a:srcRect l="-5350" r="-5350"/>
           <a:stretch>
             <a:fillRect/>
           </a:stretch>
@@ -7480,7 +7480,15 @@
           <a:p>
             <a:r>
               <a:rPr lang="en-US" dirty="0"/>
-              <a:t>Blue Waters (JYC) , 2 nodes, 32 cores each</a:t>
+              <a:t>Blue Waters (JYC</a:t>
+            </a:r>
+            <a:r>
+              <a:rPr lang="en-US" dirty="0" smtClean="0"/>
+              <a:t>), </a:t>
+            </a:r>
+            <a:r>
+              <a:rPr lang="en-US" dirty="0"/>
+              <a:t>2 nodes, 32 cores each</a:t>
             </a:r>
           </a:p>
         </p:txBody>
@@ -7503,10 +7511,15 @@
               </a:ext>
             </a:extLst>
           </a:blip>
-          <a:srcRect t="40688" b="40688"/>
+          <a:srcRect l="-17329" r="-17329"/>
           <a:stretch/>
         </p:blipFill>
-        <p:spPr/>
+        <p:spPr>
+          <a:xfrm>
+            <a:off x="261865" y="1197439"/>
+            <a:ext cx="8615360" cy="4462751"/>
+          </a:xfrm>
+        </p:spPr>
       </p:pic>
       <p:sp>
         <p:nvSpPr>
@@ -7621,7 +7634,12 @@
             <p:ph type="body" idx="1"/>
           </p:nvPr>
         </p:nvSpPr>
-        <p:spPr/>
+        <p:spPr>
+          <a:xfrm>
+            <a:off x="780770" y="1394619"/>
+            <a:ext cx="4114800" cy="639762"/>
+          </a:xfrm>
+        </p:spPr>
         <p:txBody>
           <a:bodyPr/>
           <a:lstStyle/>
@@ -7651,12 +7669,17 @@
               </a:ext>
             </a:extLst>
           </a:blip>
-          <a:srcRect l="15729" r="15729"/>
+          <a:srcRect t="-8025" b="-8025"/>
           <a:stretch>
             <a:fillRect/>
           </a:stretch>
         </p:blipFill>
-        <p:spPr/>
+        <p:spPr>
+          <a:xfrm>
+            <a:off x="261864" y="1714500"/>
+            <a:ext cx="5172987" cy="4675188"/>
+          </a:xfrm>
+        </p:spPr>
       </p:pic>
       <p:sp>
         <p:nvSpPr>
@@ -7673,32 +7696,50 @@
           <a:bodyPr/>
           <a:lstStyle/>
           <a:p>
+            <a:endParaRPr lang="en-US" dirty="0"/>
+          </a:p>
+        </p:txBody>
+      </p:sp>
+      <p:sp>
+        <p:nvSpPr>
+          <p:cNvPr id="6" name="Content Placeholder 5"/>
+          <p:cNvSpPr>
+            <a:spLocks noGrp="1"/>
+          </p:cNvSpPr>
+          <p:nvPr>
+            <p:ph sz="quarter" idx="4"/>
+          </p:nvPr>
+        </p:nvSpPr>
+        <p:spPr>
+          <a:xfrm>
+            <a:off x="5434851" y="1714500"/>
+            <a:ext cx="3442374" cy="4675188"/>
+          </a:xfrm>
+        </p:spPr>
+        <p:txBody>
+          <a:bodyPr anchor="t" anchorCtr="0"/>
+          <a:lstStyle/>
+          <a:p>
+            <a:pPr marL="0" indent="0">
+              <a:buNone/>
+            </a:pPr>
             <a:r>
               <a:rPr lang="en-US" dirty="0" smtClean="0"/>
               <a:t>Solution:</a:t>
             </a:r>
-            <a:endParaRPr lang="en-US" dirty="0"/>
-          </a:p>
-        </p:txBody>
-      </p:sp>
-      <p:sp>
-        <p:nvSpPr>
-          <p:cNvPr id="6" name="Content Placeholder 5"/>
-          <p:cNvSpPr>
-            <a:spLocks noGrp="1"/>
-          </p:cNvSpPr>
-          <p:nvPr>
-            <p:ph sz="quarter" idx="4"/>
-          </p:nvPr>
-        </p:nvSpPr>
-        <p:spPr/>
-        <p:txBody>
-          <a:bodyPr/>
-          <a:lstStyle/>
-          <a:p>
+            <a:endParaRPr lang="en-US" dirty="0" smtClean="0"/>
+          </a:p>
+          <a:p>
+            <a:pPr marL="0" indent="0">
+              <a:buNone/>
+            </a:pPr>
+            <a:r>
+              <a:rPr lang="en-US" dirty="0" smtClean="0"/>
+              <a:t>Split </a:t>
+            </a:r>
             <a:r>
               <a:rPr lang="en-US" dirty="0"/>
-              <a:t>Split compute objects that may have too much work, using a heuristic based on number of interacting atoms</a:t>
+              <a:t>compute objects that may have too much work, using a heuristic based on number of interacting atoms</a:t>
             </a:r>
           </a:p>
         </p:txBody>
@@ -8503,7 +8544,7 @@
           <a:graphicData uri="http://schemas.openxmlformats.org/presentationml/2006/ole">
             <mc:AlternateContent xmlns:mc="http://schemas.openxmlformats.org/markup-compatibility/2006">
               <mc:Choice xmlns:v="urn:schemas-microsoft-com:vml" Requires="v">
-                <p:oleObj spid="_x0000_s3133" name="Equation" r:id="rId3" imgW="165100" imgH="431800" progId="Equation.3">
+                <p:oleObj spid="_x0000_s3141" name="Equation" r:id="rId3" imgW="165100" imgH="431800" progId="Equation.3">
                   <p:embed/>
                 </p:oleObj>
               </mc:Choice>
@@ -8921,7 +8962,15 @@
             </a:r>
             <a:r>
               <a:rPr lang="en-US" dirty="0"/>
-              <a:t>object t then waits for all </a:t>
+              <a:t>object </a:t>
+            </a:r>
+            <a:r>
+              <a:rPr lang="en-US" i="1" dirty="0"/>
+              <a:t>t</a:t>
+            </a:r>
+            <a:r>
+              <a:rPr lang="en-US" dirty="0"/>
+              <a:t> then waits for all </a:t>
             </a:r>
             <a:r>
               <a:rPr lang="en-US" i="1" dirty="0"/>
@@ -9133,7 +9182,14 @@
                 <a:latin typeface="Lucida Console"/>
                 <a:cs typeface="Lucida Console"/>
               </a:rPr>
-              <a:t>Fib </a:t>
+              <a:t>Fib</a:t>
+            </a:r>
+            <a:r>
+              <a:rPr lang="en-US" dirty="0">
+                <a:latin typeface="+mn-lt"/>
+                <a:cs typeface="Lucida Console"/>
+              </a:rPr>
+              <a:t> </a:t>
             </a:r>
             <a:r>
               <a:rPr lang="en-US" dirty="0"/>
@@ -9167,7 +9223,11 @@
             </a:r>
             <a:r>
               <a:rPr lang="en-US" i="1" dirty="0"/>
-              <a:t>(n 1) </a:t>
+              <a:t>(</a:t>
+            </a:r>
+            <a:r>
+              <a:rPr lang="en-US" i="1" dirty="0" smtClean="0"/>
+              <a:t>n – 1) </a:t>
             </a:r>
             <a:r>
               <a:rPr lang="en-US" dirty="0"/>
@@ -9179,7 +9239,11 @@
             </a:r>
             <a:r>
               <a:rPr lang="en-US" i="1" dirty="0"/>
-              <a:t>(n 2) </a:t>
+              <a:t>(</a:t>
+            </a:r>
+            <a:r>
+              <a:rPr lang="en-US" i="1" dirty="0" smtClean="0"/>
+              <a:t>n – 2) </a:t>
             </a:r>
             <a:r>
               <a:rPr lang="en-US" dirty="0"/>
@@ -10768,8 +10832,12 @@
               <a:t>time units, and the sequential program takes </a:t>
             </a:r>
             <a:r>
-              <a:rPr lang="en-US" i="1" dirty="0" err="1"/>
-              <a:t>Tseq</a:t>
+              <a:rPr lang="en-US" i="1" dirty="0"/>
+              <a:t>T</a:t>
+            </a:r>
+            <a:r>
+              <a:rPr lang="en-US" i="1" baseline="-25000" dirty="0"/>
+              <a:t>seq</a:t>
             </a:r>
             <a:r>
               <a:rPr lang="en-US" dirty="0"/>
@@ -10923,7 +10991,7 @@
           <a:graphicData uri="http://schemas.openxmlformats.org/presentationml/2006/ole">
             <mc:AlternateContent xmlns:mc="http://schemas.openxmlformats.org/markup-compatibility/2006">
               <mc:Choice xmlns:v="urn:schemas-microsoft-com:vml" Requires="v">
-                <p:oleObj spid="_x0000_s1143" name="Equation" r:id="rId3" imgW="292100" imgH="393700" progId="Equation.3">
+                <p:oleObj spid="_x0000_s1158" name="Equation" r:id="rId3" imgW="292100" imgH="393700" progId="Equation.3">
                   <p:embed/>
                 </p:oleObj>
               </mc:Choice>
@@ -10980,7 +11048,7 @@
           <a:graphicData uri="http://schemas.openxmlformats.org/presentationml/2006/ole">
             <mc:AlternateContent xmlns:mc="http://schemas.openxmlformats.org/markup-compatibility/2006">
               <mc:Choice xmlns:v="urn:schemas-microsoft-com:vml" Requires="v">
-                <p:oleObj spid="_x0000_s1144" name="Equation" r:id="rId5" imgW="355600" imgH="393700" progId="Equation.3">
+                <p:oleObj spid="_x0000_s1159" name="Equation" r:id="rId5" imgW="355600" imgH="393700" progId="Equation.3">
                   <p:embed/>
                 </p:oleObj>
               </mc:Choice>
@@ -11404,7 +11472,7 @@
           <a:graphicData uri="http://schemas.openxmlformats.org/presentationml/2006/ole">
             <mc:AlternateContent xmlns:mc="http://schemas.openxmlformats.org/markup-compatibility/2006">
               <mc:Choice xmlns:v="urn:schemas-microsoft-com:vml" Requires="v">
-                <p:oleObj spid="_x0000_s2223" name="Equation" r:id="rId3" imgW="825500" imgH="457200" progId="Equation.3">
+                <p:oleObj spid="_x0000_s2245" name="Equation" r:id="rId3" imgW="825500" imgH="457200" progId="Equation.3">
                   <p:embed/>
                 </p:oleObj>
               </mc:Choice>
@@ -11461,7 +11529,7 @@
           <a:graphicData uri="http://schemas.openxmlformats.org/presentationml/2006/ole">
             <mc:AlternateContent xmlns:mc="http://schemas.openxmlformats.org/markup-compatibility/2006">
               <mc:Choice xmlns:v="urn:schemas-microsoft-com:vml" Requires="v">
-                <p:oleObj spid="_x0000_s2224" name="Equation" r:id="rId5" imgW="1028700" imgH="457200" progId="Equation.3">
+                <p:oleObj spid="_x0000_s2246" name="Equation" r:id="rId5" imgW="1028700" imgH="457200" progId="Equation.3">
                   <p:embed/>
                 </p:oleObj>
               </mc:Choice>
@@ -11518,7 +11586,7 @@
           <a:graphicData uri="http://schemas.openxmlformats.org/presentationml/2006/ole">
             <mc:AlternateContent xmlns:mc="http://schemas.openxmlformats.org/markup-compatibility/2006">
               <mc:Choice xmlns:v="urn:schemas-microsoft-com:vml" Requires="v">
-                <p:oleObj spid="_x0000_s2225" name="Equation" r:id="rId7" imgW="1422400" imgH="914400" progId="Equation.3">
+                <p:oleObj spid="_x0000_s2247" name="Equation" r:id="rId7" imgW="1422400" imgH="914400" progId="Equation.3">
                   <p:embed/>
                 </p:oleObj>
               </mc:Choice>

</xml_diff>

<commit_message>
modified tutorial-05; hid subsection title screen
</commit_message>
<xml_diff>
--- a/tutorial-05-overdecomposition.pptx
+++ b/tutorial-05-overdecomposition.pptx
@@ -7727,7 +7727,6 @@
               <a:rPr lang="en-US" dirty="0" smtClean="0"/>
               <a:t>Solution:</a:t>
             </a:r>
-            <a:endParaRPr lang="en-US" dirty="0" smtClean="0"/>
           </a:p>
           <a:p>
             <a:pPr marL="0" indent="0">
@@ -8544,7 +8543,7 @@
           <a:graphicData uri="http://schemas.openxmlformats.org/presentationml/2006/ole">
             <mc:AlternateContent xmlns:mc="http://schemas.openxmlformats.org/markup-compatibility/2006">
               <mc:Choice xmlns:v="urn:schemas-microsoft-com:vml" Requires="v">
-                <p:oleObj spid="_x0000_s3141" name="Equation" r:id="rId3" imgW="165100" imgH="431800" progId="Equation.3">
+                <p:oleObj spid="_x0000_s3143" name="Equation" r:id="rId3" imgW="165100" imgH="431800" progId="Equation.3">
                   <p:embed/>
                 </p:oleObj>
               </mc:Choice>
@@ -10323,7 +10322,7 @@
 </file>
 
 <file path=ppt/slides/slide5.xml><?xml version="1.0" encoding="utf-8"?>
-<p:sld xmlns:a="http://schemas.openxmlformats.org/drawingml/2006/main" xmlns:r="http://schemas.openxmlformats.org/officeDocument/2006/relationships" xmlns:p="http://schemas.openxmlformats.org/presentationml/2006/main">
+<p:sld xmlns:a="http://schemas.openxmlformats.org/drawingml/2006/main" xmlns:r="http://schemas.openxmlformats.org/officeDocument/2006/relationships" xmlns:p="http://schemas.openxmlformats.org/presentationml/2006/main" show="0">
   <p:cSld>
     <p:spTree>
       <p:nvGrpSpPr>
@@ -10454,6 +10453,14 @@
   <p:clrMapOvr>
     <a:masterClrMapping/>
   </p:clrMapOvr>
+  <mc:AlternateContent xmlns:mc="http://schemas.openxmlformats.org/markup-compatibility/2006">
+    <mc:Choice xmlns:p14="http://schemas.microsoft.com/office/powerpoint/2010/main" Requires="p14">
+      <p:transition spd="slow" p14:dur="2000"/>
+    </mc:Choice>
+    <mc:Fallback>
+      <p:transition xmlns:p14="http://schemas.microsoft.com/office/powerpoint/2010/main" spd="slow"/>
+    </mc:Fallback>
+  </mc:AlternateContent>
   <p:timing>
     <p:tnLst>
       <p:par>
@@ -10991,7 +10998,7 @@
           <a:graphicData uri="http://schemas.openxmlformats.org/presentationml/2006/ole">
             <mc:AlternateContent xmlns:mc="http://schemas.openxmlformats.org/markup-compatibility/2006">
               <mc:Choice xmlns:v="urn:schemas-microsoft-com:vml" Requires="v">
-                <p:oleObj spid="_x0000_s1158" name="Equation" r:id="rId3" imgW="292100" imgH="393700" progId="Equation.3">
+                <p:oleObj spid="_x0000_s1161" name="Equation" r:id="rId3" imgW="292100" imgH="393700" progId="Equation.3">
                   <p:embed/>
                 </p:oleObj>
               </mc:Choice>
@@ -11048,7 +11055,7 @@
           <a:graphicData uri="http://schemas.openxmlformats.org/presentationml/2006/ole">
             <mc:AlternateContent xmlns:mc="http://schemas.openxmlformats.org/markup-compatibility/2006">
               <mc:Choice xmlns:v="urn:schemas-microsoft-com:vml" Requires="v">
-                <p:oleObj spid="_x0000_s1159" name="Equation" r:id="rId5" imgW="355600" imgH="393700" progId="Equation.3">
+                <p:oleObj spid="_x0000_s1162" name="Equation" r:id="rId5" imgW="355600" imgH="393700" progId="Equation.3">
                   <p:embed/>
                 </p:oleObj>
               </mc:Choice>
@@ -11472,7 +11479,7 @@
           <a:graphicData uri="http://schemas.openxmlformats.org/presentationml/2006/ole">
             <mc:AlternateContent xmlns:mc="http://schemas.openxmlformats.org/markup-compatibility/2006">
               <mc:Choice xmlns:v="urn:schemas-microsoft-com:vml" Requires="v">
-                <p:oleObj spid="_x0000_s2245" name="Equation" r:id="rId3" imgW="825500" imgH="457200" progId="Equation.3">
+                <p:oleObj spid="_x0000_s2249" name="Equation" r:id="rId3" imgW="825500" imgH="457200" progId="Equation.3">
                   <p:embed/>
                 </p:oleObj>
               </mc:Choice>
@@ -11529,7 +11536,7 @@
           <a:graphicData uri="http://schemas.openxmlformats.org/presentationml/2006/ole">
             <mc:AlternateContent xmlns:mc="http://schemas.openxmlformats.org/markup-compatibility/2006">
               <mc:Choice xmlns:v="urn:schemas-microsoft-com:vml" Requires="v">
-                <p:oleObj spid="_x0000_s2246" name="Equation" r:id="rId5" imgW="1028700" imgH="457200" progId="Equation.3">
+                <p:oleObj spid="_x0000_s2250" name="Equation" r:id="rId5" imgW="1028700" imgH="457200" progId="Equation.3">
                   <p:embed/>
                 </p:oleObj>
               </mc:Choice>
@@ -11586,7 +11593,7 @@
           <a:graphicData uri="http://schemas.openxmlformats.org/presentationml/2006/ole">
             <mc:AlternateContent xmlns:mc="http://schemas.openxmlformats.org/markup-compatibility/2006">
               <mc:Choice xmlns:v="urn:schemas-microsoft-com:vml" Requires="v">
-                <p:oleObj spid="_x0000_s2247" name="Equation" r:id="rId7" imgW="1422400" imgH="914400" progId="Equation.3">
+                <p:oleObj spid="_x0000_s2251" name="Equation" r:id="rId7" imgW="1422400" imgH="914400" progId="Equation.3">
                   <p:embed/>
                 </p:oleObj>
               </mc:Choice>

</xml_diff>